<commit_message>
major rewrite by me
</commit_message>
<xml_diff>
--- a/contribution figure 2.pptx
+++ b/contribution figure 2.pptx
@@ -197,7 +197,7 @@
           <a:p>
             <a:fld id="{CE639E60-3A5F-4897-A609-5CEDE4123314}" type="datetimeFigureOut">
               <a:rPr lang="en-GB" smtClean="0"/>
-              <a:t>07/07/2017</a:t>
+              <a:t>06/09/2017</a:t>
             </a:fld>
             <a:endParaRPr lang="en-GB"/>
           </a:p>
@@ -685,7 +685,7 @@
           <a:p>
             <a:fld id="{4C8DADF7-AC45-47D6-93EA-C504A6ACF6B3}" type="datetimeFigureOut">
               <a:rPr lang="en-GB" smtClean="0"/>
-              <a:t>07/07/2017</a:t>
+              <a:t>06/09/2017</a:t>
             </a:fld>
             <a:endParaRPr lang="en-GB"/>
           </a:p>
@@ -855,7 +855,7 @@
           <a:p>
             <a:fld id="{4C8DADF7-AC45-47D6-93EA-C504A6ACF6B3}" type="datetimeFigureOut">
               <a:rPr lang="en-GB" smtClean="0"/>
-              <a:t>07/07/2017</a:t>
+              <a:t>06/09/2017</a:t>
             </a:fld>
             <a:endParaRPr lang="en-GB"/>
           </a:p>
@@ -1035,7 +1035,7 @@
           <a:p>
             <a:fld id="{4C8DADF7-AC45-47D6-93EA-C504A6ACF6B3}" type="datetimeFigureOut">
               <a:rPr lang="en-GB" smtClean="0"/>
-              <a:t>07/07/2017</a:t>
+              <a:t>06/09/2017</a:t>
             </a:fld>
             <a:endParaRPr lang="en-GB"/>
           </a:p>
@@ -1205,7 +1205,7 @@
           <a:p>
             <a:fld id="{4C8DADF7-AC45-47D6-93EA-C504A6ACF6B3}" type="datetimeFigureOut">
               <a:rPr lang="en-GB" smtClean="0"/>
-              <a:t>07/07/2017</a:t>
+              <a:t>06/09/2017</a:t>
             </a:fld>
             <a:endParaRPr lang="en-GB"/>
           </a:p>
@@ -1451,7 +1451,7 @@
           <a:p>
             <a:fld id="{4C8DADF7-AC45-47D6-93EA-C504A6ACF6B3}" type="datetimeFigureOut">
               <a:rPr lang="en-GB" smtClean="0"/>
-              <a:t>07/07/2017</a:t>
+              <a:t>06/09/2017</a:t>
             </a:fld>
             <a:endParaRPr lang="en-GB"/>
           </a:p>
@@ -1683,7 +1683,7 @@
           <a:p>
             <a:fld id="{4C8DADF7-AC45-47D6-93EA-C504A6ACF6B3}" type="datetimeFigureOut">
               <a:rPr lang="en-GB" smtClean="0"/>
-              <a:t>07/07/2017</a:t>
+              <a:t>06/09/2017</a:t>
             </a:fld>
             <a:endParaRPr lang="en-GB"/>
           </a:p>
@@ -2050,7 +2050,7 @@
           <a:p>
             <a:fld id="{4C8DADF7-AC45-47D6-93EA-C504A6ACF6B3}" type="datetimeFigureOut">
               <a:rPr lang="en-GB" smtClean="0"/>
-              <a:t>07/07/2017</a:t>
+              <a:t>06/09/2017</a:t>
             </a:fld>
             <a:endParaRPr lang="en-GB"/>
           </a:p>
@@ -2168,7 +2168,7 @@
           <a:p>
             <a:fld id="{4C8DADF7-AC45-47D6-93EA-C504A6ACF6B3}" type="datetimeFigureOut">
               <a:rPr lang="en-GB" smtClean="0"/>
-              <a:t>07/07/2017</a:t>
+              <a:t>06/09/2017</a:t>
             </a:fld>
             <a:endParaRPr lang="en-GB"/>
           </a:p>
@@ -2263,7 +2263,7 @@
           <a:p>
             <a:fld id="{4C8DADF7-AC45-47D6-93EA-C504A6ACF6B3}" type="datetimeFigureOut">
               <a:rPr lang="en-GB" smtClean="0"/>
-              <a:t>07/07/2017</a:t>
+              <a:t>06/09/2017</a:t>
             </a:fld>
             <a:endParaRPr lang="en-GB"/>
           </a:p>
@@ -2540,7 +2540,7 @@
           <a:p>
             <a:fld id="{4C8DADF7-AC45-47D6-93EA-C504A6ACF6B3}" type="datetimeFigureOut">
               <a:rPr lang="en-GB" smtClean="0"/>
-              <a:t>07/07/2017</a:t>
+              <a:t>06/09/2017</a:t>
             </a:fld>
             <a:endParaRPr lang="en-GB"/>
           </a:p>
@@ -2797,7 +2797,7 @@
           <a:p>
             <a:fld id="{4C8DADF7-AC45-47D6-93EA-C504A6ACF6B3}" type="datetimeFigureOut">
               <a:rPr lang="en-GB" smtClean="0"/>
-              <a:t>07/07/2017</a:t>
+              <a:t>06/09/2017</a:t>
             </a:fld>
             <a:endParaRPr lang="en-GB"/>
           </a:p>
@@ -3010,7 +3010,7 @@
           <a:p>
             <a:fld id="{4C8DADF7-AC45-47D6-93EA-C504A6ACF6B3}" type="datetimeFigureOut">
               <a:rPr lang="en-GB" smtClean="0"/>
-              <a:t>07/07/2017</a:t>
+              <a:t>06/09/2017</a:t>
             </a:fld>
             <a:endParaRPr lang="en-GB"/>
           </a:p>
@@ -3417,100 +3417,56 @@
       </p:grpSpPr>
       <p:sp>
         <p:nvSpPr>
-          <p:cNvPr id="270" name="Rectangle 269"/>
+          <p:cNvPr id="287" name="Rectangle 286"/>
           <p:cNvSpPr/>
           <p:nvPr/>
         </p:nvSpPr>
         <p:spPr>
-          <a:xfrm rot="2700000">
-            <a:off x="682878" y="1746785"/>
-            <a:ext cx="1206673" cy="1206673"/>
+          <a:xfrm>
+            <a:off x="3627352" y="3232510"/>
+            <a:ext cx="284837" cy="336695"/>
           </a:xfrm>
           <a:prstGeom prst="rect">
             <a:avLst/>
           </a:prstGeom>
-          <a:noFill/>
-          <a:ln w="57150" cmpd="dbl">
-            <a:solidFill>
-              <a:schemeClr val="bg1">
-                <a:lumMod val="50000"/>
-              </a:schemeClr>
-            </a:solidFill>
-          </a:ln>
-        </p:spPr>
-        <p:style>
-          <a:lnRef idx="2">
-            <a:schemeClr val="accent1">
-              <a:shade val="50000"/>
-            </a:schemeClr>
-          </a:lnRef>
-          <a:fillRef idx="1">
-            <a:schemeClr val="accent1"/>
-          </a:fillRef>
-          <a:effectRef idx="0">
-            <a:schemeClr val="accent1"/>
-          </a:effectRef>
-          <a:fontRef idx="minor">
-            <a:schemeClr val="lt1"/>
-          </a:fontRef>
-        </p:style>
-        <p:txBody>
-          <a:bodyPr rtlCol="0" anchor="ctr"/>
-          <a:lstStyle/>
-          <a:p>
-            <a:pPr algn="ctr"/>
-            <a:endParaRPr lang="en-GB" sz="1588">
+        </p:spPr>
+        <p:txBody>
+          <a:bodyPr wrap="square">
+            <a:spAutoFit/>
+          </a:bodyPr>
+          <a:lstStyle/>
+          <a:p>
+            <a:r>
+              <a:rPr lang="en-US" sz="1588" b="1" i="1" dirty="0">
+                <a:solidFill>
+                  <a:schemeClr val="bg2">
+                    <a:lumMod val="25000"/>
+                  </a:schemeClr>
+                </a:solidFill>
+                <a:latin typeface="Palatino Linotype" panose="02040502050505030304" pitchFamily="18" charset="0"/>
+              </a:rPr>
+              <a:t>D</a:t>
+            </a:r>
+            <a:endParaRPr lang="en-GB" sz="1588" b="1" i="1" dirty="0">
+              <a:solidFill>
+                <a:schemeClr val="bg2">
+                  <a:lumMod val="25000"/>
+                </a:schemeClr>
+              </a:solidFill>
               <a:latin typeface="Palatino Linotype" panose="02040502050505030304" pitchFamily="18" charset="0"/>
             </a:endParaRPr>
           </a:p>
         </p:txBody>
       </p:sp>
-      <p:cxnSp>
-        <p:nvCxnSpPr>
-          <p:cNvPr id="271" name="Straight Connector 270"/>
-          <p:cNvCxnSpPr/>
-          <p:nvPr/>
-        </p:nvCxnSpPr>
-        <p:spPr>
-          <a:xfrm>
-            <a:off x="1286215" y="1496875"/>
-            <a:ext cx="0" cy="1706494"/>
-          </a:xfrm>
-          <a:prstGeom prst="line">
-            <a:avLst/>
-          </a:prstGeom>
-          <a:ln w="57150" cmpd="dbl">
-            <a:solidFill>
-              <a:schemeClr val="bg1">
-                <a:lumMod val="50000"/>
-              </a:schemeClr>
-            </a:solidFill>
-          </a:ln>
-        </p:spPr>
-        <p:style>
-          <a:lnRef idx="1">
-            <a:schemeClr val="accent1"/>
-          </a:lnRef>
-          <a:fillRef idx="0">
-            <a:schemeClr val="accent1"/>
-          </a:fillRef>
-          <a:effectRef idx="0">
-            <a:schemeClr val="accent1"/>
-          </a:effectRef>
-          <a:fontRef idx="minor">
-            <a:schemeClr val="tx1"/>
-          </a:fontRef>
-        </p:style>
-      </p:cxnSp>
-      <p:sp>
-        <p:nvSpPr>
-          <p:cNvPr id="272" name="Rectangle 271"/>
+      <p:sp>
+        <p:nvSpPr>
+          <p:cNvPr id="284" name="Rectangle 283"/>
           <p:cNvSpPr/>
           <p:nvPr/>
         </p:nvSpPr>
         <p:spPr>
           <a:xfrm>
-            <a:off x="2112623" y="2203668"/>
+            <a:off x="4613495" y="2190856"/>
             <a:ext cx="332142" cy="336695"/>
           </a:xfrm>
           <a:prstGeom prst="rect">
@@ -3547,14 +3503,14 @@
       </p:sp>
       <p:sp>
         <p:nvSpPr>
-          <p:cNvPr id="273" name="Rectangle 272"/>
+          <p:cNvPr id="285" name="Rectangle 284"/>
           <p:cNvSpPr/>
           <p:nvPr/>
         </p:nvSpPr>
         <p:spPr>
           <a:xfrm>
-            <a:off x="1184819" y="1195857"/>
-            <a:ext cx="202795" cy="336695"/>
+            <a:off x="3618683" y="1183861"/>
+            <a:ext cx="273267" cy="336695"/>
           </a:xfrm>
           <a:prstGeom prst="rect">
             <a:avLst/>
@@ -3590,13 +3546,13 @@
       </p:sp>
       <p:sp>
         <p:nvSpPr>
-          <p:cNvPr id="274" name="Rectangle 273"/>
+          <p:cNvPr id="286" name="Rectangle 285"/>
           <p:cNvSpPr/>
           <p:nvPr/>
         </p:nvSpPr>
         <p:spPr>
           <a:xfrm>
-            <a:off x="156272" y="2203888"/>
+            <a:off x="2594022" y="2190857"/>
             <a:ext cx="324128" cy="336695"/>
           </a:xfrm>
           <a:prstGeom prst="rect">
@@ -3631,928 +3587,19 @@
           </a:p>
         </p:txBody>
       </p:sp>
-      <p:sp>
-        <p:nvSpPr>
-          <p:cNvPr id="275" name="Rectangle 274"/>
-          <p:cNvSpPr/>
-          <p:nvPr/>
-        </p:nvSpPr>
-        <p:spPr>
-          <a:xfrm>
-            <a:off x="1183583" y="3232510"/>
-            <a:ext cx="202795" cy="336695"/>
-          </a:xfrm>
-          <a:prstGeom prst="rect">
-            <a:avLst/>
-          </a:prstGeom>
-        </p:spPr>
-        <p:txBody>
-          <a:bodyPr wrap="square">
-            <a:spAutoFit/>
-          </a:bodyPr>
-          <a:lstStyle/>
-          <a:p>
-            <a:r>
-              <a:rPr lang="en-US" sz="1588" b="1" i="1" dirty="0">
-                <a:solidFill>
-                  <a:schemeClr val="bg2">
-                    <a:lumMod val="25000"/>
-                  </a:schemeClr>
-                </a:solidFill>
-                <a:latin typeface="Palatino Linotype" panose="02040502050505030304" pitchFamily="18" charset="0"/>
-              </a:rPr>
-              <a:t>D</a:t>
-            </a:r>
-            <a:endParaRPr lang="en-GB" sz="1588" b="1" i="1" dirty="0">
-              <a:solidFill>
-                <a:schemeClr val="bg2">
-                  <a:lumMod val="25000"/>
-                </a:schemeClr>
-              </a:solidFill>
-              <a:latin typeface="Palatino Linotype" panose="02040502050505030304" pitchFamily="18" charset="0"/>
-            </a:endParaRPr>
-          </a:p>
-        </p:txBody>
-      </p:sp>
-      <p:sp>
-        <p:nvSpPr>
-          <p:cNvPr id="281" name="Rectangle 280"/>
-          <p:cNvSpPr/>
-          <p:nvPr/>
-        </p:nvSpPr>
-        <p:spPr>
-          <a:xfrm>
-            <a:off x="3549161" y="3243179"/>
-            <a:ext cx="202795" cy="336695"/>
-          </a:xfrm>
-          <a:prstGeom prst="rect">
-            <a:avLst/>
-          </a:prstGeom>
-        </p:spPr>
-        <p:txBody>
-          <a:bodyPr wrap="square">
-            <a:spAutoFit/>
-          </a:bodyPr>
-          <a:lstStyle/>
-          <a:p>
-            <a:r>
-              <a:rPr lang="en-US" sz="1588" b="1" i="1" dirty="0">
-                <a:solidFill>
-                  <a:schemeClr val="bg2">
-                    <a:lumMod val="25000"/>
-                  </a:schemeClr>
-                </a:solidFill>
-                <a:latin typeface="Palatino Linotype" panose="02040502050505030304" pitchFamily="18" charset="0"/>
-              </a:rPr>
-              <a:t>D</a:t>
-            </a:r>
-            <a:endParaRPr lang="en-GB" sz="1588" b="1" i="1" dirty="0">
-              <a:solidFill>
-                <a:schemeClr val="bg2">
-                  <a:lumMod val="25000"/>
-                </a:schemeClr>
-              </a:solidFill>
-              <a:latin typeface="Palatino Linotype" panose="02040502050505030304" pitchFamily="18" charset="0"/>
-            </a:endParaRPr>
-          </a:p>
-        </p:txBody>
-      </p:sp>
-      <p:sp>
-        <p:nvSpPr>
-          <p:cNvPr id="276" name="Rectangle 275"/>
-          <p:cNvSpPr/>
-          <p:nvPr/>
-        </p:nvSpPr>
-        <p:spPr>
-          <a:xfrm rot="2700000">
-            <a:off x="3048456" y="1757455"/>
-            <a:ext cx="1206673" cy="1206673"/>
-          </a:xfrm>
-          <a:prstGeom prst="rect">
-            <a:avLst/>
-          </a:prstGeom>
-          <a:noFill/>
-          <a:ln w="57150" cmpd="dbl">
-            <a:solidFill>
-              <a:schemeClr val="bg1">
-                <a:lumMod val="50000"/>
-              </a:schemeClr>
-            </a:solidFill>
-          </a:ln>
-        </p:spPr>
-        <p:style>
-          <a:lnRef idx="2">
-            <a:schemeClr val="accent1">
-              <a:shade val="50000"/>
-            </a:schemeClr>
-          </a:lnRef>
-          <a:fillRef idx="1">
-            <a:schemeClr val="accent1"/>
-          </a:fillRef>
-          <a:effectRef idx="0">
-            <a:schemeClr val="accent1"/>
-          </a:effectRef>
-          <a:fontRef idx="minor">
-            <a:schemeClr val="lt1"/>
-          </a:fontRef>
-        </p:style>
-        <p:txBody>
-          <a:bodyPr rtlCol="0" anchor="ctr"/>
-          <a:lstStyle/>
-          <a:p>
-            <a:pPr algn="ctr"/>
-            <a:endParaRPr lang="en-GB" sz="1588">
-              <a:latin typeface="Palatino Linotype" panose="02040502050505030304" pitchFamily="18" charset="0"/>
-            </a:endParaRPr>
-          </a:p>
-        </p:txBody>
-      </p:sp>
-      <p:cxnSp>
-        <p:nvCxnSpPr>
-          <p:cNvPr id="277" name="Straight Connector 276"/>
-          <p:cNvCxnSpPr/>
-          <p:nvPr/>
-        </p:nvCxnSpPr>
-        <p:spPr>
-          <a:xfrm>
-            <a:off x="3651792" y="1507544"/>
-            <a:ext cx="0" cy="1706494"/>
-          </a:xfrm>
-          <a:prstGeom prst="line">
-            <a:avLst/>
-          </a:prstGeom>
-          <a:ln w="57150" cmpd="dbl">
-            <a:solidFill>
-              <a:schemeClr val="bg1">
-                <a:lumMod val="50000"/>
-              </a:schemeClr>
-            </a:solidFill>
-          </a:ln>
-        </p:spPr>
-        <p:style>
-          <a:lnRef idx="1">
-            <a:schemeClr val="accent1"/>
-          </a:lnRef>
-          <a:fillRef idx="0">
-            <a:schemeClr val="accent1"/>
-          </a:fillRef>
-          <a:effectRef idx="0">
-            <a:schemeClr val="accent1"/>
-          </a:effectRef>
-          <a:fontRef idx="minor">
-            <a:schemeClr val="tx1"/>
-          </a:fontRef>
-        </p:style>
-      </p:cxnSp>
-      <p:sp>
-        <p:nvSpPr>
-          <p:cNvPr id="278" name="Rectangle 277"/>
-          <p:cNvSpPr/>
-          <p:nvPr/>
-        </p:nvSpPr>
-        <p:spPr>
-          <a:xfrm>
-            <a:off x="4478201" y="2214337"/>
-            <a:ext cx="332142" cy="336695"/>
-          </a:xfrm>
-          <a:prstGeom prst="rect">
-            <a:avLst/>
-          </a:prstGeom>
-        </p:spPr>
-        <p:txBody>
-          <a:bodyPr wrap="none">
-            <a:spAutoFit/>
-          </a:bodyPr>
-          <a:lstStyle/>
-          <a:p>
-            <a:r>
-              <a:rPr lang="en-US" sz="1588" b="1" i="1" dirty="0">
-                <a:solidFill>
-                  <a:schemeClr val="bg2">
-                    <a:lumMod val="25000"/>
-                  </a:schemeClr>
-                </a:solidFill>
-                <a:latin typeface="Palatino Linotype" panose="02040502050505030304" pitchFamily="18" charset="0"/>
-              </a:rPr>
-              <a:t>A</a:t>
-            </a:r>
-            <a:endParaRPr lang="en-GB" sz="1588" b="1" i="1" dirty="0">
-              <a:solidFill>
-                <a:schemeClr val="bg2">
-                  <a:lumMod val="25000"/>
-                </a:schemeClr>
-              </a:solidFill>
-              <a:latin typeface="Palatino Linotype" panose="02040502050505030304" pitchFamily="18" charset="0"/>
-            </a:endParaRPr>
-          </a:p>
-        </p:txBody>
-      </p:sp>
-      <p:sp>
-        <p:nvSpPr>
-          <p:cNvPr id="279" name="Rectangle 278"/>
-          <p:cNvSpPr/>
-          <p:nvPr/>
-        </p:nvSpPr>
-        <p:spPr>
-          <a:xfrm>
-            <a:off x="3550396" y="1206527"/>
-            <a:ext cx="202795" cy="336695"/>
-          </a:xfrm>
-          <a:prstGeom prst="rect">
-            <a:avLst/>
-          </a:prstGeom>
-        </p:spPr>
-        <p:txBody>
-          <a:bodyPr wrap="square">
-            <a:spAutoFit/>
-          </a:bodyPr>
-          <a:lstStyle/>
-          <a:p>
-            <a:r>
-              <a:rPr lang="en-US" sz="1588" b="1" i="1" dirty="0">
-                <a:solidFill>
-                  <a:schemeClr val="bg2">
-                    <a:lumMod val="25000"/>
-                  </a:schemeClr>
-                </a:solidFill>
-                <a:latin typeface="Palatino Linotype" panose="02040502050505030304" pitchFamily="18" charset="0"/>
-              </a:rPr>
-              <a:t>B</a:t>
-            </a:r>
-            <a:endParaRPr lang="en-GB" sz="1588" b="1" i="1" dirty="0">
-              <a:solidFill>
-                <a:schemeClr val="bg2">
-                  <a:lumMod val="25000"/>
-                </a:schemeClr>
-              </a:solidFill>
-              <a:latin typeface="Palatino Linotype" panose="02040502050505030304" pitchFamily="18" charset="0"/>
-            </a:endParaRPr>
-          </a:p>
-        </p:txBody>
-      </p:sp>
-      <p:sp>
-        <p:nvSpPr>
-          <p:cNvPr id="280" name="Rectangle 279"/>
-          <p:cNvSpPr/>
-          <p:nvPr/>
-        </p:nvSpPr>
-        <p:spPr>
-          <a:xfrm>
-            <a:off x="2521850" y="2214559"/>
-            <a:ext cx="324128" cy="336695"/>
-          </a:xfrm>
-          <a:prstGeom prst="rect">
-            <a:avLst/>
-          </a:prstGeom>
-        </p:spPr>
-        <p:txBody>
-          <a:bodyPr wrap="none">
-            <a:spAutoFit/>
-          </a:bodyPr>
-          <a:lstStyle/>
-          <a:p>
-            <a:r>
-              <a:rPr lang="en-US" sz="1588" b="1" i="1" dirty="0">
-                <a:solidFill>
-                  <a:schemeClr val="bg2">
-                    <a:lumMod val="25000"/>
-                  </a:schemeClr>
-                </a:solidFill>
-                <a:latin typeface="Palatino Linotype" panose="02040502050505030304" pitchFamily="18" charset="0"/>
-              </a:rPr>
-              <a:t>C</a:t>
-            </a:r>
-            <a:endParaRPr lang="en-GB" sz="1588" b="1" i="1" dirty="0">
-              <a:solidFill>
-                <a:schemeClr val="bg2">
-                  <a:lumMod val="25000"/>
-                </a:schemeClr>
-              </a:solidFill>
-              <a:latin typeface="Palatino Linotype" panose="02040502050505030304" pitchFamily="18" charset="0"/>
-            </a:endParaRPr>
-          </a:p>
-        </p:txBody>
-      </p:sp>
-      <p:cxnSp>
-        <p:nvCxnSpPr>
-          <p:cNvPr id="288" name="Straight Arrow Connector 287"/>
-          <p:cNvCxnSpPr/>
-          <p:nvPr/>
-        </p:nvCxnSpPr>
-        <p:spPr>
-          <a:xfrm flipH="1">
-            <a:off x="3100494" y="1499680"/>
-            <a:ext cx="474774" cy="460957"/>
-          </a:xfrm>
-          <a:prstGeom prst="straightConnector1">
-            <a:avLst/>
-          </a:prstGeom>
-          <a:ln w="38100">
-            <a:solidFill>
-              <a:schemeClr val="tx1"/>
-            </a:solidFill>
-            <a:tailEnd type="triangle"/>
-          </a:ln>
-        </p:spPr>
-        <p:style>
-          <a:lnRef idx="1">
-            <a:schemeClr val="accent1"/>
-          </a:lnRef>
-          <a:fillRef idx="0">
-            <a:schemeClr val="accent1"/>
-          </a:fillRef>
-          <a:effectRef idx="0">
-            <a:schemeClr val="accent1"/>
-          </a:effectRef>
-          <a:fontRef idx="minor">
-            <a:schemeClr val="tx1"/>
-          </a:fontRef>
-        </p:style>
-      </p:cxnSp>
-      <p:cxnSp>
-        <p:nvCxnSpPr>
-          <p:cNvPr id="289" name="Straight Arrow Connector 288"/>
-          <p:cNvCxnSpPr/>
-          <p:nvPr/>
-        </p:nvCxnSpPr>
-        <p:spPr>
-          <a:xfrm>
-            <a:off x="3741860" y="1499747"/>
-            <a:ext cx="452871" cy="460989"/>
-          </a:xfrm>
-          <a:prstGeom prst="straightConnector1">
-            <a:avLst/>
-          </a:prstGeom>
-          <a:ln w="38100">
-            <a:solidFill>
-              <a:schemeClr val="tx1"/>
-            </a:solidFill>
-            <a:tailEnd type="triangle"/>
-          </a:ln>
-        </p:spPr>
-        <p:style>
-          <a:lnRef idx="1">
-            <a:schemeClr val="accent1"/>
-          </a:lnRef>
-          <a:fillRef idx="0">
-            <a:schemeClr val="accent1"/>
-          </a:fillRef>
-          <a:effectRef idx="0">
-            <a:schemeClr val="accent1"/>
-          </a:effectRef>
-          <a:fontRef idx="minor">
-            <a:schemeClr val="tx1"/>
-          </a:fontRef>
-        </p:style>
-      </p:cxnSp>
-      <p:cxnSp>
-        <p:nvCxnSpPr>
-          <p:cNvPr id="290" name="Straight Arrow Connector 289"/>
-          <p:cNvCxnSpPr/>
-          <p:nvPr/>
-        </p:nvCxnSpPr>
-        <p:spPr>
-          <a:xfrm>
-            <a:off x="3583549" y="1637650"/>
-            <a:ext cx="0" cy="566591"/>
-          </a:xfrm>
-          <a:prstGeom prst="straightConnector1">
-            <a:avLst/>
-          </a:prstGeom>
-          <a:ln w="38100">
-            <a:solidFill>
-              <a:schemeClr val="tx1"/>
-            </a:solidFill>
-            <a:tailEnd type="triangle"/>
-          </a:ln>
-        </p:spPr>
-        <p:style>
-          <a:lnRef idx="1">
-            <a:schemeClr val="accent1"/>
-          </a:lnRef>
-          <a:fillRef idx="0">
-            <a:schemeClr val="accent1"/>
-          </a:fillRef>
-          <a:effectRef idx="0">
-            <a:schemeClr val="accent1"/>
-          </a:effectRef>
-          <a:fontRef idx="minor">
-            <a:schemeClr val="tx1"/>
-          </a:fontRef>
-        </p:style>
-      </p:cxnSp>
-      <p:sp>
-        <p:nvSpPr>
-          <p:cNvPr id="291" name="Rectangle 290"/>
-          <p:cNvSpPr/>
-          <p:nvPr/>
-        </p:nvSpPr>
-        <p:spPr>
-          <a:xfrm>
-            <a:off x="3097013" y="1905853"/>
-            <a:ext cx="543739" cy="336695"/>
-          </a:xfrm>
-          <a:prstGeom prst="rect">
-            <a:avLst/>
-          </a:prstGeom>
-        </p:spPr>
-        <p:txBody>
-          <a:bodyPr wrap="none">
-            <a:spAutoFit/>
-          </a:bodyPr>
-          <a:lstStyle/>
-          <a:p>
-            <a:r>
-              <a:rPr lang="en-US" sz="1588" i="1" dirty="0" smtClean="0">
-                <a:latin typeface="Palatino Linotype" panose="02040502050505030304" pitchFamily="18" charset="0"/>
-              </a:rPr>
-              <a:t>0.68</a:t>
-            </a:r>
-            <a:endParaRPr lang="en-GB" sz="1588" i="1" dirty="0">
-              <a:latin typeface="Palatino Linotype" panose="02040502050505030304" pitchFamily="18" charset="0"/>
-            </a:endParaRPr>
-          </a:p>
-        </p:txBody>
-      </p:sp>
-      <p:sp>
-        <p:nvSpPr>
-          <p:cNvPr id="292" name="Rectangle 291"/>
-          <p:cNvSpPr/>
-          <p:nvPr/>
-        </p:nvSpPr>
-        <p:spPr>
-          <a:xfrm>
-            <a:off x="3918799" y="1487176"/>
-            <a:ext cx="441146" cy="336695"/>
-          </a:xfrm>
-          <a:prstGeom prst="rect">
-            <a:avLst/>
-          </a:prstGeom>
-        </p:spPr>
-        <p:txBody>
-          <a:bodyPr wrap="none">
-            <a:spAutoFit/>
-          </a:bodyPr>
-          <a:lstStyle/>
-          <a:p>
-            <a:r>
-              <a:rPr lang="en-US" sz="1588" i="1" dirty="0" smtClean="0">
-                <a:latin typeface="Palatino Linotype" panose="02040502050505030304" pitchFamily="18" charset="0"/>
-              </a:rPr>
-              <a:t>0.9</a:t>
-            </a:r>
-            <a:endParaRPr lang="en-GB" sz="1588" i="1" dirty="0">
-              <a:latin typeface="Palatino Linotype" panose="02040502050505030304" pitchFamily="18" charset="0"/>
-            </a:endParaRPr>
-          </a:p>
-        </p:txBody>
-      </p:sp>
-      <p:sp>
-        <p:nvSpPr>
-          <p:cNvPr id="293" name="Rectangle 292"/>
-          <p:cNvSpPr/>
-          <p:nvPr/>
-        </p:nvSpPr>
-        <p:spPr>
-          <a:xfrm>
-            <a:off x="2925573" y="2954545"/>
-            <a:ext cx="543739" cy="336695"/>
-          </a:xfrm>
-          <a:prstGeom prst="rect">
-            <a:avLst/>
-          </a:prstGeom>
-        </p:spPr>
-        <p:txBody>
-          <a:bodyPr wrap="none">
-            <a:spAutoFit/>
-          </a:bodyPr>
-          <a:lstStyle/>
-          <a:p>
-            <a:r>
-              <a:rPr lang="en-US" sz="1588" i="1" dirty="0" smtClean="0">
-                <a:latin typeface="Palatino Linotype" panose="02040502050505030304" pitchFamily="18" charset="0"/>
-              </a:rPr>
-              <a:t>0.23</a:t>
-            </a:r>
-            <a:endParaRPr lang="en-GB" sz="1588" i="1" dirty="0">
-              <a:latin typeface="Palatino Linotype" panose="02040502050505030304" pitchFamily="18" charset="0"/>
-            </a:endParaRPr>
-          </a:p>
-        </p:txBody>
-      </p:sp>
-      <p:sp>
-        <p:nvSpPr>
-          <p:cNvPr id="294" name="Rectangle 293"/>
-          <p:cNvSpPr/>
-          <p:nvPr/>
-        </p:nvSpPr>
-        <p:spPr>
-          <a:xfrm>
-            <a:off x="3992792" y="2908549"/>
-            <a:ext cx="441146" cy="336695"/>
-          </a:xfrm>
-          <a:prstGeom prst="rect">
-            <a:avLst/>
-          </a:prstGeom>
-        </p:spPr>
-        <p:txBody>
-          <a:bodyPr wrap="none">
-            <a:spAutoFit/>
-          </a:bodyPr>
-          <a:lstStyle/>
-          <a:p>
-            <a:r>
-              <a:rPr lang="en-US" sz="1588" i="1" dirty="0" smtClean="0">
-                <a:latin typeface="Palatino Linotype" panose="02040502050505030304" pitchFamily="18" charset="0"/>
-              </a:rPr>
-              <a:t>0.9</a:t>
-            </a:r>
-            <a:endParaRPr lang="en-GB" sz="1588" i="1" dirty="0">
-              <a:latin typeface="Palatino Linotype" panose="02040502050505030304" pitchFamily="18" charset="0"/>
-            </a:endParaRPr>
-          </a:p>
-        </p:txBody>
-      </p:sp>
-      <p:sp>
-        <p:nvSpPr>
-          <p:cNvPr id="295" name="Rectangle 294"/>
-          <p:cNvSpPr/>
-          <p:nvPr/>
-        </p:nvSpPr>
-        <p:spPr>
-          <a:xfrm>
-            <a:off x="2826560" y="1461776"/>
-            <a:ext cx="543739" cy="336695"/>
-          </a:xfrm>
-          <a:prstGeom prst="rect">
-            <a:avLst/>
-          </a:prstGeom>
-        </p:spPr>
-        <p:txBody>
-          <a:bodyPr wrap="none">
-            <a:spAutoFit/>
-          </a:bodyPr>
-          <a:lstStyle/>
-          <a:p>
-            <a:r>
-              <a:rPr lang="en-US" sz="1588" i="1" dirty="0" smtClean="0">
-                <a:latin typeface="Palatino Linotype" panose="02040502050505030304" pitchFamily="18" charset="0"/>
-              </a:rPr>
-              <a:t>0.</a:t>
-            </a:r>
-            <a:r>
-              <a:rPr lang="en-US" sz="1588" i="1" dirty="0" smtClean="0">
-                <a:latin typeface="Palatino Linotype" panose="02040502050505030304" pitchFamily="18" charset="0"/>
-              </a:rPr>
-              <a:t>23</a:t>
-            </a:r>
-            <a:endParaRPr lang="en-GB" sz="1588" i="1" dirty="0">
-              <a:latin typeface="Palatino Linotype" panose="02040502050505030304" pitchFamily="18" charset="0"/>
-            </a:endParaRPr>
-          </a:p>
-        </p:txBody>
-      </p:sp>
-      <p:cxnSp>
-        <p:nvCxnSpPr>
-          <p:cNvPr id="296" name="Straight Arrow Connector 295"/>
-          <p:cNvCxnSpPr/>
-          <p:nvPr/>
-        </p:nvCxnSpPr>
-        <p:spPr>
-          <a:xfrm rot="5400000">
-            <a:off x="3756173" y="2757110"/>
-            <a:ext cx="452872" cy="460989"/>
-          </a:xfrm>
-          <a:prstGeom prst="straightConnector1">
-            <a:avLst/>
-          </a:prstGeom>
-          <a:ln w="38100">
-            <a:solidFill>
-              <a:schemeClr val="tx1"/>
-            </a:solidFill>
-            <a:tailEnd type="triangle"/>
-          </a:ln>
-        </p:spPr>
-        <p:style>
-          <a:lnRef idx="1">
-            <a:schemeClr val="accent1"/>
-          </a:lnRef>
-          <a:fillRef idx="0">
-            <a:schemeClr val="accent1"/>
-          </a:fillRef>
-          <a:effectRef idx="0">
-            <a:schemeClr val="accent1"/>
-          </a:effectRef>
-          <a:fontRef idx="minor">
-            <a:schemeClr val="tx1"/>
-          </a:fontRef>
-        </p:style>
-      </p:cxnSp>
-      <p:cxnSp>
-        <p:nvCxnSpPr>
-          <p:cNvPr id="298" name="Straight Arrow Connector 297"/>
-          <p:cNvCxnSpPr/>
-          <p:nvPr/>
-        </p:nvCxnSpPr>
-        <p:spPr>
-          <a:xfrm>
-            <a:off x="3104781" y="2761168"/>
-            <a:ext cx="452871" cy="460989"/>
-          </a:xfrm>
-          <a:prstGeom prst="straightConnector1">
-            <a:avLst/>
-          </a:prstGeom>
-          <a:ln w="38100">
-            <a:solidFill>
-              <a:schemeClr val="tx1"/>
-            </a:solidFill>
-            <a:tailEnd type="triangle"/>
-          </a:ln>
-        </p:spPr>
-        <p:style>
-          <a:lnRef idx="1">
-            <a:schemeClr val="accent1"/>
-          </a:lnRef>
-          <a:fillRef idx="0">
-            <a:schemeClr val="accent1"/>
-          </a:fillRef>
-          <a:effectRef idx="0">
-            <a:schemeClr val="accent1"/>
-          </a:effectRef>
-          <a:fontRef idx="minor">
-            <a:schemeClr val="tx1"/>
-          </a:fontRef>
-        </p:style>
-      </p:cxnSp>
-      <p:sp>
-        <p:nvSpPr>
-          <p:cNvPr id="287" name="Rectangle 286"/>
-          <p:cNvSpPr/>
-          <p:nvPr/>
-        </p:nvSpPr>
-        <p:spPr>
-          <a:xfrm>
-            <a:off x="5947529" y="3253850"/>
-            <a:ext cx="202795" cy="336695"/>
-          </a:xfrm>
-          <a:prstGeom prst="rect">
-            <a:avLst/>
-          </a:prstGeom>
-        </p:spPr>
-        <p:txBody>
-          <a:bodyPr wrap="square">
-            <a:spAutoFit/>
-          </a:bodyPr>
-          <a:lstStyle/>
-          <a:p>
-            <a:r>
-              <a:rPr lang="en-US" sz="1588" b="1" i="1" dirty="0">
-                <a:solidFill>
-                  <a:schemeClr val="bg2">
-                    <a:lumMod val="25000"/>
-                  </a:schemeClr>
-                </a:solidFill>
-                <a:latin typeface="Palatino Linotype" panose="02040502050505030304" pitchFamily="18" charset="0"/>
-              </a:rPr>
-              <a:t>D</a:t>
-            </a:r>
-            <a:endParaRPr lang="en-GB" sz="1588" b="1" i="1" dirty="0">
-              <a:solidFill>
-                <a:schemeClr val="bg2">
-                  <a:lumMod val="25000"/>
-                </a:schemeClr>
-              </a:solidFill>
-              <a:latin typeface="Palatino Linotype" panose="02040502050505030304" pitchFamily="18" charset="0"/>
-            </a:endParaRPr>
-          </a:p>
-        </p:txBody>
-      </p:sp>
-      <p:sp>
-        <p:nvSpPr>
-          <p:cNvPr id="282" name="Rectangle 281"/>
-          <p:cNvSpPr/>
-          <p:nvPr/>
-        </p:nvSpPr>
-        <p:spPr>
-          <a:xfrm rot="2700000">
-            <a:off x="5446824" y="1768125"/>
-            <a:ext cx="1206673" cy="1206673"/>
-          </a:xfrm>
-          <a:prstGeom prst="rect">
-            <a:avLst/>
-          </a:prstGeom>
-          <a:noFill/>
-          <a:ln w="57150" cmpd="dbl">
-            <a:solidFill>
-              <a:schemeClr val="bg1">
-                <a:lumMod val="50000"/>
-              </a:schemeClr>
-            </a:solidFill>
-          </a:ln>
-        </p:spPr>
-        <p:style>
-          <a:lnRef idx="2">
-            <a:schemeClr val="accent1">
-              <a:shade val="50000"/>
-            </a:schemeClr>
-          </a:lnRef>
-          <a:fillRef idx="1">
-            <a:schemeClr val="accent1"/>
-          </a:fillRef>
-          <a:effectRef idx="0">
-            <a:schemeClr val="accent1"/>
-          </a:effectRef>
-          <a:fontRef idx="minor">
-            <a:schemeClr val="lt1"/>
-          </a:fontRef>
-        </p:style>
-        <p:txBody>
-          <a:bodyPr rtlCol="0" anchor="ctr"/>
-          <a:lstStyle/>
-          <a:p>
-            <a:pPr algn="ctr"/>
-            <a:endParaRPr lang="en-GB" sz="1588">
-              <a:latin typeface="Palatino Linotype" panose="02040502050505030304" pitchFamily="18" charset="0"/>
-            </a:endParaRPr>
-          </a:p>
-        </p:txBody>
-      </p:sp>
-      <p:cxnSp>
-        <p:nvCxnSpPr>
-          <p:cNvPr id="283" name="Straight Connector 282"/>
-          <p:cNvCxnSpPr/>
-          <p:nvPr/>
-        </p:nvCxnSpPr>
-        <p:spPr>
-          <a:xfrm>
-            <a:off x="6050160" y="1518215"/>
-            <a:ext cx="0" cy="1706494"/>
-          </a:xfrm>
-          <a:prstGeom prst="line">
-            <a:avLst/>
-          </a:prstGeom>
-          <a:ln w="57150" cmpd="dbl">
-            <a:solidFill>
-              <a:schemeClr val="bg1">
-                <a:lumMod val="50000"/>
-              </a:schemeClr>
-            </a:solidFill>
-          </a:ln>
-        </p:spPr>
-        <p:style>
-          <a:lnRef idx="1">
-            <a:schemeClr val="accent1"/>
-          </a:lnRef>
-          <a:fillRef idx="0">
-            <a:schemeClr val="accent1"/>
-          </a:fillRef>
-          <a:effectRef idx="0">
-            <a:schemeClr val="accent1"/>
-          </a:effectRef>
-          <a:fontRef idx="minor">
-            <a:schemeClr val="tx1"/>
-          </a:fontRef>
-        </p:style>
-      </p:cxnSp>
-      <p:sp>
-        <p:nvSpPr>
-          <p:cNvPr id="284" name="Rectangle 283"/>
-          <p:cNvSpPr/>
-          <p:nvPr/>
-        </p:nvSpPr>
-        <p:spPr>
-          <a:xfrm>
-            <a:off x="6876569" y="2225008"/>
-            <a:ext cx="332142" cy="336695"/>
-          </a:xfrm>
-          <a:prstGeom prst="rect">
-            <a:avLst/>
-          </a:prstGeom>
-        </p:spPr>
-        <p:txBody>
-          <a:bodyPr wrap="none">
-            <a:spAutoFit/>
-          </a:bodyPr>
-          <a:lstStyle/>
-          <a:p>
-            <a:r>
-              <a:rPr lang="en-US" sz="1588" b="1" i="1" dirty="0">
-                <a:solidFill>
-                  <a:schemeClr val="bg2">
-                    <a:lumMod val="25000"/>
-                  </a:schemeClr>
-                </a:solidFill>
-                <a:latin typeface="Palatino Linotype" panose="02040502050505030304" pitchFamily="18" charset="0"/>
-              </a:rPr>
-              <a:t>A</a:t>
-            </a:r>
-            <a:endParaRPr lang="en-GB" sz="1588" b="1" i="1" dirty="0">
-              <a:solidFill>
-                <a:schemeClr val="bg2">
-                  <a:lumMod val="25000"/>
-                </a:schemeClr>
-              </a:solidFill>
-              <a:latin typeface="Palatino Linotype" panose="02040502050505030304" pitchFamily="18" charset="0"/>
-            </a:endParaRPr>
-          </a:p>
-        </p:txBody>
-      </p:sp>
-      <p:sp>
-        <p:nvSpPr>
-          <p:cNvPr id="285" name="Rectangle 284"/>
-          <p:cNvSpPr/>
-          <p:nvPr/>
-        </p:nvSpPr>
-        <p:spPr>
-          <a:xfrm>
-            <a:off x="5948764" y="1217197"/>
-            <a:ext cx="202795" cy="336695"/>
-          </a:xfrm>
-          <a:prstGeom prst="rect">
-            <a:avLst/>
-          </a:prstGeom>
-        </p:spPr>
-        <p:txBody>
-          <a:bodyPr wrap="square">
-            <a:spAutoFit/>
-          </a:bodyPr>
-          <a:lstStyle/>
-          <a:p>
-            <a:r>
-              <a:rPr lang="en-US" sz="1588" b="1" i="1" dirty="0">
-                <a:solidFill>
-                  <a:schemeClr val="bg2">
-                    <a:lumMod val="25000"/>
-                  </a:schemeClr>
-                </a:solidFill>
-                <a:latin typeface="Palatino Linotype" panose="02040502050505030304" pitchFamily="18" charset="0"/>
-              </a:rPr>
-              <a:t>B</a:t>
-            </a:r>
-            <a:endParaRPr lang="en-GB" sz="1588" b="1" i="1" dirty="0">
-              <a:solidFill>
-                <a:schemeClr val="bg2">
-                  <a:lumMod val="25000"/>
-                </a:schemeClr>
-              </a:solidFill>
-              <a:latin typeface="Palatino Linotype" panose="02040502050505030304" pitchFamily="18" charset="0"/>
-            </a:endParaRPr>
-          </a:p>
-        </p:txBody>
-      </p:sp>
-      <p:sp>
-        <p:nvSpPr>
-          <p:cNvPr id="286" name="Rectangle 285"/>
-          <p:cNvSpPr/>
-          <p:nvPr/>
-        </p:nvSpPr>
-        <p:spPr>
-          <a:xfrm>
-            <a:off x="4920218" y="2225228"/>
-            <a:ext cx="324128" cy="336695"/>
-          </a:xfrm>
-          <a:prstGeom prst="rect">
-            <a:avLst/>
-          </a:prstGeom>
-        </p:spPr>
-        <p:txBody>
-          <a:bodyPr wrap="none">
-            <a:spAutoFit/>
-          </a:bodyPr>
-          <a:lstStyle/>
-          <a:p>
-            <a:r>
-              <a:rPr lang="en-US" sz="1588" b="1" i="1" dirty="0">
-                <a:solidFill>
-                  <a:schemeClr val="bg2">
-                    <a:lumMod val="25000"/>
-                  </a:schemeClr>
-                </a:solidFill>
-                <a:latin typeface="Palatino Linotype" panose="02040502050505030304" pitchFamily="18" charset="0"/>
-              </a:rPr>
-              <a:t>C</a:t>
-            </a:r>
-            <a:endParaRPr lang="en-GB" sz="1588" b="1" i="1" dirty="0">
-              <a:solidFill>
-                <a:schemeClr val="bg2">
-                  <a:lumMod val="25000"/>
-                </a:schemeClr>
-              </a:solidFill>
-              <a:latin typeface="Palatino Linotype" panose="02040502050505030304" pitchFamily="18" charset="0"/>
-            </a:endParaRPr>
-          </a:p>
-        </p:txBody>
-      </p:sp>
       <p:cxnSp>
         <p:nvCxnSpPr>
           <p:cNvPr id="297" name="Straight Arrow Connector 296"/>
-          <p:cNvCxnSpPr/>
+          <p:cNvCxnSpPr>
+            <a:stCxn id="284" idx="1"/>
+            <a:endCxn id="78" idx="7"/>
+          </p:cNvCxnSpPr>
           <p:nvPr/>
         </p:nvCxnSpPr>
         <p:spPr>
-          <a:xfrm rot="5400000">
-            <a:off x="6159047" y="2767780"/>
-            <a:ext cx="452872" cy="460989"/>
+          <a:xfrm flipH="1">
+            <a:off x="3813316" y="2359204"/>
+            <a:ext cx="800179" cy="795391"/>
           </a:xfrm>
           <a:prstGeom prst="straightConnector1">
             <a:avLst/>
@@ -4582,13 +3629,16 @@
       <p:cxnSp>
         <p:nvCxnSpPr>
           <p:cNvPr id="299" name="Straight Arrow Connector 298"/>
-          <p:cNvCxnSpPr/>
+          <p:cNvCxnSpPr>
+            <a:stCxn id="78" idx="1"/>
+            <a:endCxn id="79" idx="5"/>
+          </p:cNvCxnSpPr>
           <p:nvPr/>
         </p:nvCxnSpPr>
         <p:spPr>
-          <a:xfrm rot="10800000">
-            <a:off x="5483613" y="2761742"/>
-            <a:ext cx="452871" cy="460989"/>
+          <a:xfrm flipH="1" flipV="1">
+            <a:off x="2983897" y="2384123"/>
+            <a:ext cx="742432" cy="770472"/>
           </a:xfrm>
           <a:prstGeom prst="straightConnector1">
             <a:avLst/>
@@ -4618,13 +3668,15 @@
       <p:cxnSp>
         <p:nvCxnSpPr>
           <p:cNvPr id="300" name="Straight Arrow Connector 299"/>
-          <p:cNvCxnSpPr/>
+          <p:cNvCxnSpPr>
+            <a:endCxn id="76" idx="3"/>
+          </p:cNvCxnSpPr>
           <p:nvPr/>
         </p:nvCxnSpPr>
         <p:spPr>
-          <a:xfrm rot="10800000" flipH="1">
-            <a:off x="5472755" y="1518217"/>
-            <a:ext cx="474774" cy="460957"/>
+          <a:xfrm flipV="1">
+            <a:off x="2985481" y="1549320"/>
+            <a:ext cx="735597" cy="756888"/>
           </a:xfrm>
           <a:prstGeom prst="straightConnector1">
             <a:avLst/>
@@ -4654,13 +3706,16 @@
       <p:cxnSp>
         <p:nvCxnSpPr>
           <p:cNvPr id="301" name="Straight Arrow Connector 300"/>
-          <p:cNvCxnSpPr/>
+          <p:cNvCxnSpPr>
+            <a:stCxn id="77" idx="1"/>
+            <a:endCxn id="76" idx="5"/>
+          </p:cNvCxnSpPr>
           <p:nvPr/>
         </p:nvCxnSpPr>
         <p:spPr>
-          <a:xfrm rot="10800000">
-            <a:off x="6158632" y="1510335"/>
-            <a:ext cx="452871" cy="460989"/>
+          <a:xfrm flipH="1" flipV="1">
+            <a:off x="3808065" y="1549320"/>
+            <a:ext cx="761937" cy="755293"/>
           </a:xfrm>
           <a:prstGeom prst="straightConnector1">
             <a:avLst/>
@@ -4690,13 +3745,15 @@
       <p:cxnSp>
         <p:nvCxnSpPr>
           <p:cNvPr id="302" name="Straight Arrow Connector 301"/>
-          <p:cNvCxnSpPr/>
+          <p:cNvCxnSpPr>
+            <a:endCxn id="76" idx="4"/>
+          </p:cNvCxnSpPr>
           <p:nvPr/>
         </p:nvCxnSpPr>
         <p:spPr>
-          <a:xfrm rot="10800000">
-            <a:off x="5992945" y="2435740"/>
-            <a:ext cx="0" cy="566591"/>
+          <a:xfrm flipV="1">
+            <a:off x="3764571" y="1565787"/>
+            <a:ext cx="1" cy="1573786"/>
           </a:xfrm>
           <a:prstGeom prst="straightConnector1">
             <a:avLst/>
@@ -4731,7 +3788,7 @@
         </p:nvSpPr>
         <p:spPr>
           <a:xfrm>
-            <a:off x="5479833" y="2441132"/>
+            <a:off x="3283343" y="2170564"/>
             <a:ext cx="543739" cy="336695"/>
           </a:xfrm>
           <a:prstGeom prst="rect">
@@ -4764,7 +3821,7 @@
         </p:nvSpPr>
         <p:spPr>
           <a:xfrm>
-            <a:off x="6364256" y="1478978"/>
+            <a:off x="4099758" y="1605532"/>
             <a:ext cx="543739" cy="336695"/>
           </a:xfrm>
           <a:prstGeom prst="rect">
@@ -4797,7 +3854,7 @@
         </p:nvSpPr>
         <p:spPr>
           <a:xfrm>
-            <a:off x="5252877" y="2968447"/>
+            <a:off x="2907591" y="2737302"/>
             <a:ext cx="543739" cy="336695"/>
           </a:xfrm>
           <a:prstGeom prst="rect">
@@ -4830,7 +3887,7 @@
         </p:nvSpPr>
         <p:spPr>
           <a:xfrm>
-            <a:off x="6372232" y="2900350"/>
+            <a:off x="4123940" y="2735707"/>
             <a:ext cx="543739" cy="336695"/>
           </a:xfrm>
           <a:prstGeom prst="rect">
@@ -4863,7 +3920,7 @@
         </p:nvSpPr>
         <p:spPr>
           <a:xfrm>
-            <a:off x="5282201" y="1478978"/>
+            <a:off x="2915467" y="1605205"/>
             <a:ext cx="543739" cy="336695"/>
           </a:xfrm>
           <a:prstGeom prst="rect">
@@ -4923,13 +3980,13 @@
       </p:sp>
       <p:sp>
         <p:nvSpPr>
-          <p:cNvPr id="309" name="Rectangle 308"/>
+          <p:cNvPr id="310" name="Rectangle 309"/>
           <p:cNvSpPr/>
           <p:nvPr/>
         </p:nvSpPr>
         <p:spPr>
           <a:xfrm>
-            <a:off x="3162769" y="804639"/>
+            <a:off x="3297547" y="781531"/>
             <a:ext cx="1039067" cy="336695"/>
           </a:xfrm>
           <a:prstGeom prst="rect">
@@ -4946,7 +4003,13 @@
               <a:rPr lang="en-US" sz="1588" dirty="0">
                 <a:latin typeface="Palatino Linotype" panose="02040502050505030304" pitchFamily="18" charset="0"/>
               </a:rPr>
-              <a:t>Figure 2b</a:t>
+              <a:t>Figure </a:t>
+            </a:r>
+            <a:r>
+              <a:rPr lang="en-US" sz="1588" dirty="0" smtClean="0">
+                <a:latin typeface="Palatino Linotype" panose="02040502050505030304" pitchFamily="18" charset="0"/>
+              </a:rPr>
+              <a:t>2b</a:t>
             </a:r>
             <a:endParaRPr lang="en-GB" sz="1588" dirty="0">
               <a:latin typeface="Palatino Linotype" panose="02040502050505030304" pitchFamily="18" charset="0"/>
@@ -4956,100 +4019,24 @@
       </p:sp>
       <p:sp>
         <p:nvSpPr>
-          <p:cNvPr id="310" name="Rectangle 309"/>
+          <p:cNvPr id="76" name="Oval 75"/>
           <p:cNvSpPr/>
           <p:nvPr/>
         </p:nvSpPr>
         <p:spPr>
           <a:xfrm>
-            <a:off x="5579779" y="804639"/>
-            <a:ext cx="1016625" cy="336695"/>
-          </a:xfrm>
-          <a:prstGeom prst="rect">
+            <a:off x="3703063" y="1453342"/>
+            <a:ext cx="123017" cy="112445"/>
+          </a:xfrm>
+          <a:prstGeom prst="ellipse">
             <a:avLst/>
           </a:prstGeom>
-        </p:spPr>
-        <p:txBody>
-          <a:bodyPr wrap="none">
-            <a:spAutoFit/>
-          </a:bodyPr>
-          <a:lstStyle/>
-          <a:p>
-            <a:r>
-              <a:rPr lang="en-US" sz="1588" dirty="0">
-                <a:latin typeface="Palatino Linotype" panose="02040502050505030304" pitchFamily="18" charset="0"/>
-              </a:rPr>
-              <a:t>Figure 2c</a:t>
-            </a:r>
-            <a:endParaRPr lang="en-GB" sz="1588" dirty="0">
-              <a:latin typeface="Palatino Linotype" panose="02040502050505030304" pitchFamily="18" charset="0"/>
-            </a:endParaRPr>
-          </a:p>
-        </p:txBody>
-      </p:sp>
-      <p:sp>
-        <p:nvSpPr>
-          <p:cNvPr id="51" name="Rectangle 50"/>
-          <p:cNvSpPr/>
-          <p:nvPr/>
-        </p:nvSpPr>
-        <p:spPr>
-          <a:xfrm>
-            <a:off x="8300443" y="3264701"/>
-            <a:ext cx="202794" cy="336695"/>
-          </a:xfrm>
-          <a:prstGeom prst="rect">
-            <a:avLst/>
-          </a:prstGeom>
-        </p:spPr>
-        <p:txBody>
-          <a:bodyPr wrap="square">
-            <a:spAutoFit/>
-          </a:bodyPr>
-          <a:lstStyle/>
-          <a:p>
-            <a:r>
-              <a:rPr lang="en-US" sz="1588" b="1" i="1" dirty="0">
-                <a:solidFill>
-                  <a:schemeClr val="bg2">
-                    <a:lumMod val="25000"/>
-                  </a:schemeClr>
-                </a:solidFill>
-                <a:latin typeface="Palatino Linotype" panose="02040502050505030304" pitchFamily="18" charset="0"/>
-              </a:rPr>
-              <a:t>D</a:t>
-            </a:r>
-            <a:endParaRPr lang="en-GB" sz="1588" b="1" i="1" dirty="0">
-              <a:solidFill>
-                <a:schemeClr val="bg2">
-                  <a:lumMod val="25000"/>
-                </a:schemeClr>
-              </a:solidFill>
-              <a:latin typeface="Palatino Linotype" panose="02040502050505030304" pitchFamily="18" charset="0"/>
-            </a:endParaRPr>
-          </a:p>
-        </p:txBody>
-      </p:sp>
-      <p:sp>
-        <p:nvSpPr>
-          <p:cNvPr id="53" name="Rectangle 52"/>
-          <p:cNvSpPr/>
-          <p:nvPr/>
-        </p:nvSpPr>
-        <p:spPr>
-          <a:xfrm rot="2700000">
-            <a:off x="7799737" y="1778977"/>
-            <a:ext cx="1206673" cy="1206673"/>
-          </a:xfrm>
-          <a:prstGeom prst="rect">
-            <a:avLst/>
-          </a:prstGeom>
-          <a:noFill/>
-          <a:ln w="57150" cmpd="dbl">
+          <a:solidFill>
+            <a:schemeClr val="tx1"/>
+          </a:solidFill>
+          <a:ln>
             <a:solidFill>
-              <a:schemeClr val="bg1">
-                <a:lumMod val="50000"/>
-              </a:schemeClr>
+              <a:schemeClr val="tx1"/>
             </a:solidFill>
           </a:ln>
         </p:spPr>
@@ -5074,58 +4061,206 @@
           <a:lstStyle/>
           <a:p>
             <a:pPr algn="ctr"/>
-            <a:endParaRPr lang="en-GB" sz="1588">
-              <a:latin typeface="Palatino Linotype" panose="02040502050505030304" pitchFamily="18" charset="0"/>
-            </a:endParaRPr>
-          </a:p>
-        </p:txBody>
-      </p:sp>
-      <p:cxnSp>
-        <p:nvCxnSpPr>
-          <p:cNvPr id="54" name="Straight Connector 53"/>
-          <p:cNvCxnSpPr/>
+            <a:endParaRPr lang="en-US"/>
+          </a:p>
+        </p:txBody>
+      </p:sp>
+      <p:sp>
+        <p:nvSpPr>
+          <p:cNvPr id="77" name="Oval 76"/>
+          <p:cNvSpPr/>
           <p:nvPr/>
-        </p:nvCxnSpPr>
-        <p:spPr>
-          <a:xfrm>
-            <a:off x="8403074" y="1529066"/>
-            <a:ext cx="0" cy="1515264"/>
-          </a:xfrm>
-          <a:prstGeom prst="line">
+        </p:nvSpPr>
+        <p:spPr>
+          <a:xfrm>
+            <a:off x="4551987" y="2288146"/>
+            <a:ext cx="123017" cy="112445"/>
+          </a:xfrm>
+          <a:prstGeom prst="ellipse">
             <a:avLst/>
           </a:prstGeom>
-          <a:ln w="57150" cmpd="dbl">
+          <a:solidFill>
+            <a:schemeClr val="tx1"/>
+          </a:solidFill>
+          <a:ln>
             <a:solidFill>
-              <a:schemeClr val="bg1">
-                <a:lumMod val="50000"/>
-              </a:schemeClr>
+              <a:schemeClr val="tx1"/>
             </a:solidFill>
           </a:ln>
         </p:spPr>
         <p:style>
-          <a:lnRef idx="1">
-            <a:schemeClr val="accent1"/>
+          <a:lnRef idx="2">
+            <a:schemeClr val="accent1">
+              <a:shade val="50000"/>
+            </a:schemeClr>
           </a:lnRef>
-          <a:fillRef idx="0">
+          <a:fillRef idx="1">
             <a:schemeClr val="accent1"/>
           </a:fillRef>
           <a:effectRef idx="0">
             <a:schemeClr val="accent1"/>
           </a:effectRef>
           <a:fontRef idx="minor">
-            <a:schemeClr val="tx1"/>
+            <a:schemeClr val="lt1"/>
           </a:fontRef>
         </p:style>
-      </p:cxnSp>
-      <p:sp>
-        <p:nvSpPr>
-          <p:cNvPr id="55" name="Rectangle 54"/>
+        <p:txBody>
+          <a:bodyPr rtlCol="0" anchor="ctr"/>
+          <a:lstStyle/>
+          <a:p>
+            <a:pPr algn="ctr"/>
+            <a:endParaRPr lang="en-US"/>
+          </a:p>
+        </p:txBody>
+      </p:sp>
+      <p:sp>
+        <p:nvSpPr>
+          <p:cNvPr id="78" name="Oval 77"/>
           <p:cNvSpPr/>
           <p:nvPr/>
         </p:nvSpPr>
         <p:spPr>
           <a:xfrm>
-            <a:off x="9229481" y="2235859"/>
+            <a:off x="3708314" y="3138128"/>
+            <a:ext cx="123017" cy="112445"/>
+          </a:xfrm>
+          <a:prstGeom prst="ellipse">
+            <a:avLst/>
+          </a:prstGeom>
+          <a:solidFill>
+            <a:schemeClr val="tx1"/>
+          </a:solidFill>
+          <a:ln>
+            <a:solidFill>
+              <a:schemeClr val="tx1"/>
+            </a:solidFill>
+          </a:ln>
+        </p:spPr>
+        <p:style>
+          <a:lnRef idx="2">
+            <a:schemeClr val="accent1">
+              <a:shade val="50000"/>
+            </a:schemeClr>
+          </a:lnRef>
+          <a:fillRef idx="1">
+            <a:schemeClr val="accent1"/>
+          </a:fillRef>
+          <a:effectRef idx="0">
+            <a:schemeClr val="accent1"/>
+          </a:effectRef>
+          <a:fontRef idx="minor">
+            <a:schemeClr val="lt1"/>
+          </a:fontRef>
+        </p:style>
+        <p:txBody>
+          <a:bodyPr rtlCol="0" anchor="ctr"/>
+          <a:lstStyle/>
+          <a:p>
+            <a:pPr algn="ctr"/>
+            <a:endParaRPr lang="en-US"/>
+          </a:p>
+        </p:txBody>
+      </p:sp>
+      <p:sp>
+        <p:nvSpPr>
+          <p:cNvPr id="79" name="Oval 78"/>
+          <p:cNvSpPr/>
+          <p:nvPr/>
+        </p:nvSpPr>
+        <p:spPr>
+          <a:xfrm>
+            <a:off x="2878895" y="2288145"/>
+            <a:ext cx="123017" cy="112445"/>
+          </a:xfrm>
+          <a:prstGeom prst="ellipse">
+            <a:avLst/>
+          </a:prstGeom>
+          <a:solidFill>
+            <a:schemeClr val="tx1"/>
+          </a:solidFill>
+          <a:ln>
+            <a:solidFill>
+              <a:schemeClr val="tx1"/>
+            </a:solidFill>
+          </a:ln>
+        </p:spPr>
+        <p:style>
+          <a:lnRef idx="2">
+            <a:schemeClr val="accent1">
+              <a:shade val="50000"/>
+            </a:schemeClr>
+          </a:lnRef>
+          <a:fillRef idx="1">
+            <a:schemeClr val="accent1"/>
+          </a:fillRef>
+          <a:effectRef idx="0">
+            <a:schemeClr val="accent1"/>
+          </a:effectRef>
+          <a:fontRef idx="minor">
+            <a:schemeClr val="lt1"/>
+          </a:fontRef>
+        </p:style>
+        <p:txBody>
+          <a:bodyPr rtlCol="0" anchor="ctr"/>
+          <a:lstStyle/>
+          <a:p>
+            <a:pPr algn="ctr"/>
+            <a:endParaRPr lang="en-US"/>
+          </a:p>
+        </p:txBody>
+      </p:sp>
+      <p:sp>
+        <p:nvSpPr>
+          <p:cNvPr id="91" name="Rectangle 90"/>
+          <p:cNvSpPr/>
+          <p:nvPr/>
+        </p:nvSpPr>
+        <p:spPr>
+          <a:xfrm>
+            <a:off x="1122696" y="3232510"/>
+            <a:ext cx="284837" cy="336695"/>
+          </a:xfrm>
+          <a:prstGeom prst="rect">
+            <a:avLst/>
+          </a:prstGeom>
+        </p:spPr>
+        <p:txBody>
+          <a:bodyPr wrap="square">
+            <a:spAutoFit/>
+          </a:bodyPr>
+          <a:lstStyle/>
+          <a:p>
+            <a:r>
+              <a:rPr lang="en-US" sz="1588" b="1" i="1" dirty="0">
+                <a:solidFill>
+                  <a:schemeClr val="bg2">
+                    <a:lumMod val="25000"/>
+                  </a:schemeClr>
+                </a:solidFill>
+                <a:latin typeface="Palatino Linotype" panose="02040502050505030304" pitchFamily="18" charset="0"/>
+              </a:rPr>
+              <a:t>D</a:t>
+            </a:r>
+            <a:endParaRPr lang="en-GB" sz="1588" b="1" i="1" dirty="0">
+              <a:solidFill>
+                <a:schemeClr val="bg2">
+                  <a:lumMod val="25000"/>
+                </a:schemeClr>
+              </a:solidFill>
+              <a:latin typeface="Palatino Linotype" panose="02040502050505030304" pitchFamily="18" charset="0"/>
+            </a:endParaRPr>
+          </a:p>
+        </p:txBody>
+      </p:sp>
+      <p:sp>
+        <p:nvSpPr>
+          <p:cNvPr id="92" name="Rectangle 91"/>
+          <p:cNvSpPr/>
+          <p:nvPr/>
+        </p:nvSpPr>
+        <p:spPr>
+          <a:xfrm>
+            <a:off x="2108839" y="2190856"/>
             <a:ext cx="332142" cy="336695"/>
           </a:xfrm>
           <a:prstGeom prst="rect">
@@ -5162,14 +4297,14 @@
       </p:sp>
       <p:sp>
         <p:nvSpPr>
-          <p:cNvPr id="56" name="Rectangle 55"/>
+          <p:cNvPr id="93" name="Rectangle 92"/>
           <p:cNvSpPr/>
           <p:nvPr/>
         </p:nvSpPr>
         <p:spPr>
           <a:xfrm>
-            <a:off x="8301680" y="1228048"/>
-            <a:ext cx="202794" cy="336695"/>
+            <a:off x="1114027" y="1183861"/>
+            <a:ext cx="273267" cy="336695"/>
           </a:xfrm>
           <a:prstGeom prst="rect">
             <a:avLst/>
@@ -5205,13 +4340,13 @@
       </p:sp>
       <p:sp>
         <p:nvSpPr>
-          <p:cNvPr id="57" name="Rectangle 56"/>
+          <p:cNvPr id="94" name="Rectangle 93"/>
           <p:cNvSpPr/>
           <p:nvPr/>
         </p:nvSpPr>
         <p:spPr>
           <a:xfrm>
-            <a:off x="7273132" y="2236080"/>
+            <a:off x="89366" y="2190857"/>
             <a:ext cx="324128" cy="336695"/>
           </a:xfrm>
           <a:prstGeom prst="rect">
@@ -5248,14 +4383,14 @@
       </p:sp>
       <p:cxnSp>
         <p:nvCxnSpPr>
-          <p:cNvPr id="58" name="Straight Arrow Connector 57"/>
+          <p:cNvPr id="95" name="Straight Arrow Connector 94"/>
           <p:cNvCxnSpPr/>
           <p:nvPr/>
         </p:nvCxnSpPr>
         <p:spPr>
-          <a:xfrm rot="5400000">
-            <a:off x="8511962" y="2778629"/>
-            <a:ext cx="452872" cy="460990"/>
+          <a:xfrm flipH="1">
+            <a:off x="1308660" y="2359204"/>
+            <a:ext cx="800179" cy="795391"/>
           </a:xfrm>
           <a:prstGeom prst="straightConnector1">
             <a:avLst/>
@@ -5264,7 +4399,7 @@
             <a:solidFill>
               <a:schemeClr val="tx1"/>
             </a:solidFill>
-            <a:tailEnd type="triangle"/>
+            <a:tailEnd type="none"/>
           </a:ln>
         </p:spPr>
         <p:style>
@@ -5284,14 +4419,14 @@
       </p:cxnSp>
       <p:cxnSp>
         <p:nvCxnSpPr>
-          <p:cNvPr id="59" name="Straight Arrow Connector 58"/>
+          <p:cNvPr id="96" name="Straight Arrow Connector 95"/>
           <p:cNvCxnSpPr/>
           <p:nvPr/>
         </p:nvCxnSpPr>
         <p:spPr>
-          <a:xfrm rot="10800000">
-            <a:off x="7836524" y="2772592"/>
-            <a:ext cx="452872" cy="460990"/>
+          <a:xfrm flipH="1" flipV="1">
+            <a:off x="479241" y="2384123"/>
+            <a:ext cx="742432" cy="770472"/>
           </a:xfrm>
           <a:prstGeom prst="straightConnector1">
             <a:avLst/>
@@ -5300,7 +4435,7 @@
             <a:solidFill>
               <a:schemeClr val="tx1"/>
             </a:solidFill>
-            <a:tailEnd type="triangle"/>
+            <a:tailEnd type="none"/>
           </a:ln>
         </p:spPr>
         <p:style>
@@ -5320,14 +4455,14 @@
       </p:cxnSp>
       <p:cxnSp>
         <p:nvCxnSpPr>
-          <p:cNvPr id="60" name="Straight Arrow Connector 59"/>
+          <p:cNvPr id="97" name="Straight Arrow Connector 96"/>
           <p:cNvCxnSpPr/>
           <p:nvPr/>
         </p:nvCxnSpPr>
         <p:spPr>
-          <a:xfrm rot="10800000" flipH="1">
-            <a:off x="7825669" y="1529068"/>
-            <a:ext cx="474774" cy="460957"/>
+          <a:xfrm flipV="1">
+            <a:off x="480825" y="1549320"/>
+            <a:ext cx="735597" cy="756888"/>
           </a:xfrm>
           <a:prstGeom prst="straightConnector1">
             <a:avLst/>
@@ -5336,7 +4471,7 @@
             <a:solidFill>
               <a:schemeClr val="tx1"/>
             </a:solidFill>
-            <a:tailEnd type="triangle"/>
+            <a:tailEnd type="none"/>
           </a:ln>
         </p:spPr>
         <p:style>
@@ -5356,14 +4491,14 @@
       </p:cxnSp>
       <p:cxnSp>
         <p:nvCxnSpPr>
-          <p:cNvPr id="61" name="Straight Arrow Connector 60"/>
+          <p:cNvPr id="98" name="Straight Arrow Connector 97"/>
           <p:cNvCxnSpPr/>
           <p:nvPr/>
         </p:nvCxnSpPr>
         <p:spPr>
-          <a:xfrm rot="10800000">
-            <a:off x="8511544" y="1521184"/>
-            <a:ext cx="452872" cy="460990"/>
+          <a:xfrm flipH="1" flipV="1">
+            <a:off x="1303409" y="1549320"/>
+            <a:ext cx="761937" cy="755293"/>
           </a:xfrm>
           <a:prstGeom prst="straightConnector1">
             <a:avLst/>
@@ -5372,7 +4507,7 @@
             <a:solidFill>
               <a:schemeClr val="tx1"/>
             </a:solidFill>
-            <a:tailEnd type="triangle"/>
+            <a:tailEnd type="none"/>
           </a:ln>
         </p:spPr>
         <p:style>
@@ -5392,14 +4527,16 @@
       </p:cxnSp>
       <p:cxnSp>
         <p:nvCxnSpPr>
-          <p:cNvPr id="62" name="Straight Arrow Connector 61"/>
-          <p:cNvCxnSpPr/>
+          <p:cNvPr id="99" name="Straight Arrow Connector 98"/>
+          <p:cNvCxnSpPr>
+            <a:stCxn id="107" idx="0"/>
+          </p:cNvCxnSpPr>
           <p:nvPr/>
         </p:nvCxnSpPr>
         <p:spPr>
-          <a:xfrm rot="10800000">
-            <a:off x="8345858" y="2175191"/>
-            <a:ext cx="0" cy="566591"/>
+          <a:xfrm flipH="1" flipV="1">
+            <a:off x="1259916" y="1565787"/>
+            <a:ext cx="5251" cy="1572341"/>
           </a:xfrm>
           <a:prstGeom prst="straightConnector1">
             <a:avLst/>
@@ -5408,7 +4545,7 @@
             <a:solidFill>
               <a:schemeClr val="tx1"/>
             </a:solidFill>
-            <a:tailEnd type="triangle"/>
+            <a:tailEnd type="none"/>
           </a:ln>
         </p:spPr>
         <p:style>
@@ -5428,311 +4565,193 @@
       </p:cxnSp>
       <p:sp>
         <p:nvSpPr>
-          <p:cNvPr id="63" name="Rectangle 62"/>
+          <p:cNvPr id="105" name="Oval 104"/>
           <p:cNvSpPr/>
           <p:nvPr/>
         </p:nvSpPr>
         <p:spPr>
           <a:xfrm>
-            <a:off x="7858825" y="2319651"/>
-            <a:ext cx="543739" cy="336695"/>
-          </a:xfrm>
-          <a:prstGeom prst="rect">
+            <a:off x="1198407" y="1453342"/>
+            <a:ext cx="123017" cy="112445"/>
+          </a:xfrm>
+          <a:prstGeom prst="ellipse">
             <a:avLst/>
           </a:prstGeom>
-        </p:spPr>
-        <p:txBody>
-          <a:bodyPr wrap="none">
-            <a:spAutoFit/>
-          </a:bodyPr>
-          <a:lstStyle/>
-          <a:p>
-            <a:r>
-              <a:rPr lang="en-US" sz="1588" i="1" dirty="0" smtClean="0">
-                <a:latin typeface="Palatino Linotype" panose="02040502050505030304" pitchFamily="18" charset="0"/>
-              </a:rPr>
-              <a:t>0.57</a:t>
-            </a:r>
-            <a:endParaRPr lang="en-GB" sz="1588" i="1" dirty="0">
-              <a:latin typeface="Palatino Linotype" panose="02040502050505030304" pitchFamily="18" charset="0"/>
-            </a:endParaRPr>
-          </a:p>
-        </p:txBody>
-      </p:sp>
-      <p:sp>
-        <p:nvSpPr>
-          <p:cNvPr id="64" name="Rectangle 63"/>
-          <p:cNvSpPr/>
-          <p:nvPr/>
-        </p:nvSpPr>
-        <p:spPr>
-          <a:xfrm>
-            <a:off x="8717168" y="1489829"/>
-            <a:ext cx="543739" cy="336695"/>
-          </a:xfrm>
-          <a:prstGeom prst="rect">
-            <a:avLst/>
-          </a:prstGeom>
-        </p:spPr>
-        <p:txBody>
-          <a:bodyPr wrap="none">
-            <a:spAutoFit/>
-          </a:bodyPr>
-          <a:lstStyle/>
-          <a:p>
-            <a:r>
-              <a:rPr lang="en-US" sz="1588" i="1" dirty="0" smtClean="0">
-                <a:latin typeface="Palatino Linotype" panose="02040502050505030304" pitchFamily="18" charset="0"/>
-              </a:rPr>
-              <a:t>0.24</a:t>
-            </a:r>
-            <a:endParaRPr lang="en-GB" sz="1588" i="1" dirty="0">
-              <a:latin typeface="Palatino Linotype" panose="02040502050505030304" pitchFamily="18" charset="0"/>
-            </a:endParaRPr>
-          </a:p>
-        </p:txBody>
-      </p:sp>
-      <p:sp>
-        <p:nvSpPr>
-          <p:cNvPr id="65" name="Rectangle 64"/>
-          <p:cNvSpPr/>
-          <p:nvPr/>
-        </p:nvSpPr>
-        <p:spPr>
-          <a:xfrm>
-            <a:off x="7631190" y="2979299"/>
-            <a:ext cx="543739" cy="336695"/>
-          </a:xfrm>
-          <a:prstGeom prst="rect">
-            <a:avLst/>
-          </a:prstGeom>
-        </p:spPr>
-        <p:txBody>
-          <a:bodyPr wrap="none">
-            <a:spAutoFit/>
-          </a:bodyPr>
-          <a:lstStyle/>
-          <a:p>
-            <a:r>
-              <a:rPr lang="en-US" sz="1588" i="1" dirty="0">
-                <a:latin typeface="Palatino Linotype" panose="02040502050505030304" pitchFamily="18" charset="0"/>
-              </a:rPr>
-              <a:t>0</a:t>
-            </a:r>
-            <a:r>
-              <a:rPr lang="en-US" sz="1588" i="1" dirty="0" smtClean="0">
-                <a:latin typeface="Palatino Linotype" panose="02040502050505030304" pitchFamily="18" charset="0"/>
-              </a:rPr>
-              <a:t>.19</a:t>
-            </a:r>
-            <a:endParaRPr lang="en-GB" sz="1588" i="1" dirty="0">
-              <a:latin typeface="Palatino Linotype" panose="02040502050505030304" pitchFamily="18" charset="0"/>
-            </a:endParaRPr>
-          </a:p>
-        </p:txBody>
-      </p:sp>
-      <p:sp>
-        <p:nvSpPr>
-          <p:cNvPr id="66" name="Rectangle 65"/>
-          <p:cNvSpPr/>
-          <p:nvPr/>
-        </p:nvSpPr>
-        <p:spPr>
-          <a:xfrm>
-            <a:off x="8725146" y="2911202"/>
-            <a:ext cx="543739" cy="336695"/>
-          </a:xfrm>
-          <a:prstGeom prst="rect">
-            <a:avLst/>
-          </a:prstGeom>
-        </p:spPr>
-        <p:txBody>
-          <a:bodyPr wrap="none">
-            <a:spAutoFit/>
-          </a:bodyPr>
-          <a:lstStyle/>
-          <a:p>
-            <a:r>
-              <a:rPr lang="en-US" sz="1588" i="1" dirty="0" smtClean="0">
-                <a:latin typeface="Palatino Linotype" panose="02040502050505030304" pitchFamily="18" charset="0"/>
-              </a:rPr>
-              <a:t>0.19</a:t>
-            </a:r>
-            <a:endParaRPr lang="en-GB" sz="1588" i="1" dirty="0">
-              <a:latin typeface="Palatino Linotype" panose="02040502050505030304" pitchFamily="18" charset="0"/>
-            </a:endParaRPr>
-          </a:p>
-        </p:txBody>
-      </p:sp>
-      <p:sp>
-        <p:nvSpPr>
-          <p:cNvPr id="67" name="Rectangle 66"/>
-          <p:cNvSpPr/>
-          <p:nvPr/>
-        </p:nvSpPr>
-        <p:spPr>
-          <a:xfrm>
-            <a:off x="7609714" y="1489829"/>
-            <a:ext cx="543739" cy="336695"/>
-          </a:xfrm>
-          <a:prstGeom prst="rect">
-            <a:avLst/>
-          </a:prstGeom>
-        </p:spPr>
-        <p:txBody>
-          <a:bodyPr wrap="none">
-            <a:spAutoFit/>
-          </a:bodyPr>
-          <a:lstStyle/>
-          <a:p>
-            <a:r>
-              <a:rPr lang="en-US" sz="1588" i="1" dirty="0" smtClean="0">
-                <a:latin typeface="Palatino Linotype" panose="02040502050505030304" pitchFamily="18" charset="0"/>
-              </a:rPr>
-              <a:t>0.19</a:t>
-            </a:r>
-            <a:endParaRPr lang="en-GB" sz="1588" i="1" dirty="0">
-              <a:latin typeface="Palatino Linotype" panose="02040502050505030304" pitchFamily="18" charset="0"/>
-            </a:endParaRPr>
-          </a:p>
-        </p:txBody>
-      </p:sp>
-      <p:cxnSp>
-        <p:nvCxnSpPr>
-          <p:cNvPr id="68" name="Straight Connector 67"/>
-          <p:cNvCxnSpPr/>
-          <p:nvPr/>
-        </p:nvCxnSpPr>
-        <p:spPr>
-          <a:xfrm flipV="1">
-            <a:off x="8398882" y="2382313"/>
-            <a:ext cx="846525" cy="651775"/>
-          </a:xfrm>
-          <a:prstGeom prst="line">
-            <a:avLst/>
-          </a:prstGeom>
-          <a:ln w="57150" cmpd="dbl">
+          <a:solidFill>
+            <a:schemeClr val="tx1"/>
+          </a:solidFill>
+          <a:ln>
             <a:solidFill>
-              <a:schemeClr val="bg1">
-                <a:lumMod val="50000"/>
-              </a:schemeClr>
+              <a:schemeClr val="tx1"/>
             </a:solidFill>
           </a:ln>
         </p:spPr>
         <p:style>
-          <a:lnRef idx="1">
-            <a:schemeClr val="accent1"/>
+          <a:lnRef idx="2">
+            <a:schemeClr val="accent1">
+              <a:shade val="50000"/>
+            </a:schemeClr>
           </a:lnRef>
-          <a:fillRef idx="0">
+          <a:fillRef idx="1">
             <a:schemeClr val="accent1"/>
           </a:fillRef>
           <a:effectRef idx="0">
             <a:schemeClr val="accent1"/>
           </a:effectRef>
           <a:fontRef idx="minor">
-            <a:schemeClr val="tx1"/>
+            <a:schemeClr val="lt1"/>
           </a:fontRef>
         </p:style>
-      </p:cxnSp>
-      <p:cxnSp>
-        <p:nvCxnSpPr>
-          <p:cNvPr id="70" name="Straight Arrow Connector 69"/>
-          <p:cNvCxnSpPr/>
+        <p:txBody>
+          <a:bodyPr rtlCol="0" anchor="ctr"/>
+          <a:lstStyle/>
+          <a:p>
+            <a:pPr algn="ctr"/>
+            <a:endParaRPr lang="en-US"/>
+          </a:p>
+        </p:txBody>
+      </p:sp>
+      <p:sp>
+        <p:nvSpPr>
+          <p:cNvPr id="106" name="Oval 105"/>
+          <p:cNvSpPr/>
           <p:nvPr/>
-        </p:nvCxnSpPr>
-        <p:spPr>
-          <a:xfrm flipH="1">
-            <a:off x="8572007" y="2478006"/>
-            <a:ext cx="458367" cy="326689"/>
-          </a:xfrm>
-          <a:prstGeom prst="straightConnector1">
+        </p:nvSpPr>
+        <p:spPr>
+          <a:xfrm>
+            <a:off x="2047331" y="2288146"/>
+            <a:ext cx="123017" cy="112445"/>
+          </a:xfrm>
+          <a:prstGeom prst="ellipse">
             <a:avLst/>
           </a:prstGeom>
-          <a:ln w="38100">
+          <a:solidFill>
+            <a:schemeClr val="tx1"/>
+          </a:solidFill>
+          <a:ln>
             <a:solidFill>
               <a:schemeClr val="tx1"/>
             </a:solidFill>
-            <a:tailEnd type="triangle"/>
           </a:ln>
         </p:spPr>
         <p:style>
-          <a:lnRef idx="1">
-            <a:schemeClr val="accent1"/>
+          <a:lnRef idx="2">
+            <a:schemeClr val="accent1">
+              <a:shade val="50000"/>
+            </a:schemeClr>
           </a:lnRef>
-          <a:fillRef idx="0">
+          <a:fillRef idx="1">
             <a:schemeClr val="accent1"/>
           </a:fillRef>
           <a:effectRef idx="0">
             <a:schemeClr val="accent1"/>
           </a:effectRef>
           <a:fontRef idx="minor">
-            <a:schemeClr val="tx1"/>
+            <a:schemeClr val="lt1"/>
           </a:fontRef>
         </p:style>
-      </p:cxnSp>
-      <p:sp>
-        <p:nvSpPr>
-          <p:cNvPr id="72" name="Rectangle 71"/>
+        <p:txBody>
+          <a:bodyPr rtlCol="0" anchor="ctr"/>
+          <a:lstStyle/>
+          <a:p>
+            <a:pPr algn="ctr"/>
+            <a:endParaRPr lang="en-US"/>
+          </a:p>
+        </p:txBody>
+      </p:sp>
+      <p:sp>
+        <p:nvSpPr>
+          <p:cNvPr id="107" name="Oval 106"/>
           <p:cNvSpPr/>
           <p:nvPr/>
         </p:nvSpPr>
         <p:spPr>
           <a:xfrm>
-            <a:off x="8470406" y="2285736"/>
-            <a:ext cx="543739" cy="336695"/>
-          </a:xfrm>
-          <a:prstGeom prst="rect">
+            <a:off x="1203658" y="3138128"/>
+            <a:ext cx="123017" cy="112445"/>
+          </a:xfrm>
+          <a:prstGeom prst="ellipse">
             <a:avLst/>
           </a:prstGeom>
-        </p:spPr>
-        <p:txBody>
-          <a:bodyPr wrap="none">
-            <a:spAutoFit/>
-          </a:bodyPr>
-          <a:lstStyle/>
-          <a:p>
-            <a:r>
-              <a:rPr lang="en-US" sz="1588" i="1" dirty="0" smtClean="0">
-                <a:latin typeface="Palatino Linotype" panose="02040502050505030304" pitchFamily="18" charset="0"/>
-              </a:rPr>
-              <a:t>0.57</a:t>
-            </a:r>
-            <a:endParaRPr lang="en-GB" sz="1588" i="1" dirty="0">
-              <a:latin typeface="Palatino Linotype" panose="02040502050505030304" pitchFamily="18" charset="0"/>
-            </a:endParaRPr>
-          </a:p>
-        </p:txBody>
-      </p:sp>
-      <p:sp>
-        <p:nvSpPr>
-          <p:cNvPr id="73" name="Rectangle 72"/>
+          <a:solidFill>
+            <a:schemeClr val="tx1"/>
+          </a:solidFill>
+          <a:ln>
+            <a:solidFill>
+              <a:schemeClr val="tx1"/>
+            </a:solidFill>
+          </a:ln>
+        </p:spPr>
+        <p:style>
+          <a:lnRef idx="2">
+            <a:schemeClr val="accent1">
+              <a:shade val="50000"/>
+            </a:schemeClr>
+          </a:lnRef>
+          <a:fillRef idx="1">
+            <a:schemeClr val="accent1"/>
+          </a:fillRef>
+          <a:effectRef idx="0">
+            <a:schemeClr val="accent1"/>
+          </a:effectRef>
+          <a:fontRef idx="minor">
+            <a:schemeClr val="lt1"/>
+          </a:fontRef>
+        </p:style>
+        <p:txBody>
+          <a:bodyPr rtlCol="0" anchor="ctr"/>
+          <a:lstStyle/>
+          <a:p>
+            <a:pPr algn="ctr"/>
+            <a:endParaRPr lang="en-US"/>
+          </a:p>
+        </p:txBody>
+      </p:sp>
+      <p:sp>
+        <p:nvSpPr>
+          <p:cNvPr id="108" name="Oval 107"/>
           <p:cNvSpPr/>
           <p:nvPr/>
         </p:nvSpPr>
         <p:spPr>
           <a:xfrm>
-            <a:off x="7941367" y="804639"/>
-            <a:ext cx="1051891" cy="336695"/>
-          </a:xfrm>
-          <a:prstGeom prst="rect">
+            <a:off x="374239" y="2288145"/>
+            <a:ext cx="123017" cy="112445"/>
+          </a:xfrm>
+          <a:prstGeom prst="ellipse">
             <a:avLst/>
           </a:prstGeom>
-        </p:spPr>
-        <p:txBody>
-          <a:bodyPr wrap="none">
-            <a:spAutoFit/>
-          </a:bodyPr>
-          <a:lstStyle/>
-          <a:p>
-            <a:r>
-              <a:rPr lang="en-US" sz="1588" dirty="0">
-                <a:latin typeface="Palatino Linotype" panose="02040502050505030304" pitchFamily="18" charset="0"/>
-              </a:rPr>
-              <a:t>Figure 2d</a:t>
-            </a:r>
-            <a:endParaRPr lang="en-GB" sz="1588" dirty="0">
-              <a:latin typeface="Palatino Linotype" panose="02040502050505030304" pitchFamily="18" charset="0"/>
-            </a:endParaRPr>
+          <a:solidFill>
+            <a:schemeClr val="tx1"/>
+          </a:solidFill>
+          <a:ln>
+            <a:solidFill>
+              <a:schemeClr val="tx1"/>
+            </a:solidFill>
+          </a:ln>
+        </p:spPr>
+        <p:style>
+          <a:lnRef idx="2">
+            <a:schemeClr val="accent1">
+              <a:shade val="50000"/>
+            </a:schemeClr>
+          </a:lnRef>
+          <a:fillRef idx="1">
+            <a:schemeClr val="accent1"/>
+          </a:fillRef>
+          <a:effectRef idx="0">
+            <a:schemeClr val="accent1"/>
+          </a:effectRef>
+          <a:fontRef idx="minor">
+            <a:schemeClr val="lt1"/>
+          </a:fontRef>
+        </p:style>
+        <p:txBody>
+          <a:bodyPr rtlCol="0" anchor="ctr"/>
+          <a:lstStyle/>
+          <a:p>
+            <a:pPr algn="ctr"/>
+            <a:endParaRPr lang="en-US"/>
           </a:p>
         </p:txBody>
       </p:sp>

</xml_diff>